<commit_message>
moved images to sub folder
</commit_message>
<xml_diff>
--- a/Power_BI_TeamsAttendance/Teams Report Theme.pptx
+++ b/Power_BI_TeamsAttendance/Teams Report Theme.pptx
@@ -105,6 +105,11 @@
       </a:defRPr>
     </a:lvl9pPr>
   </p:defaultTextStyle>
+  <p:extLst>
+    <p:ext uri="{EFAFB233-063F-42B5-8137-9DF3F51BA10A}">
+      <p15:sldGuideLst xmlns:p15="http://schemas.microsoft.com/office/powerpoint/2012/main"/>
+    </p:ext>
+  </p:extLst>
 </p:presentation>
 </file>
 
@@ -3792,7 +3797,7 @@
         </p:nvSpPr>
         <p:spPr>
           <a:xfrm>
-            <a:off x="7423190" y="2169368"/>
+            <a:off x="7255410" y="1397567"/>
             <a:ext cx="806068" cy="718288"/>
           </a:xfrm>
           <a:prstGeom prst="rect">
@@ -3860,7 +3865,7 @@
         </p:blipFill>
         <p:spPr>
           <a:xfrm>
-            <a:off x="7471034" y="2219943"/>
+            <a:off x="7303254" y="1448142"/>
             <a:ext cx="599398" cy="550267"/>
           </a:xfrm>
           <a:prstGeom prst="rect">
@@ -4342,6 +4347,45 @@
           <a:xfrm>
             <a:off x="4212199" y="3532232"/>
             <a:ext cx="914400" cy="914400"/>
+          </a:xfrm>
+          <a:prstGeom prst="rect">
+            <a:avLst/>
+          </a:prstGeom>
+        </p:spPr>
+      </p:pic>
+      <p:pic>
+        <p:nvPicPr>
+          <p:cNvPr id="3" name="Graphic 2">
+            <a:extLst>
+              <a:ext uri="{FF2B5EF4-FFF2-40B4-BE49-F238E27FC236}">
+                <a16:creationId xmlns:a16="http://schemas.microsoft.com/office/drawing/2014/main" id="{A7FB259D-C61E-4B9A-A824-5FBB20D1A4A0}"/>
+              </a:ext>
+            </a:extLst>
+          </p:cNvPr>
+          <p:cNvPicPr>
+            <a:picLocks noChangeAspect="1"/>
+          </p:cNvPicPr>
+          <p:nvPr/>
+        </p:nvPicPr>
+        <p:blipFill>
+          <a:blip r:embed="rId14">
+            <a:extLst>
+              <a:ext uri="{28A0092B-C50C-407E-A947-70E740481C1C}">
+                <a14:useLocalDpi xmlns:a14="http://schemas.microsoft.com/office/drawing/2010/main" val="0"/>
+              </a:ext>
+              <a:ext uri="{96DAC541-7B7A-43D3-8B79-37D633B846F1}">
+                <asvg:svgBlip xmlns:asvg="http://schemas.microsoft.com/office/drawing/2016/SVG/main" r:embed="rId15"/>
+              </a:ext>
+            </a:extLst>
+          </a:blip>
+          <a:stretch>
+            <a:fillRect/>
+          </a:stretch>
+        </p:blipFill>
+        <p:spPr>
+          <a:xfrm>
+            <a:off x="7209518" y="1235011"/>
+            <a:ext cx="5324237" cy="3803026"/>
           </a:xfrm>
           <a:prstGeom prst="rect">
             <a:avLst/>

</xml_diff>